<commit_message>
modify a slide in ppt, add some code
</commit_message>
<xml_diff>
--- a/PPT/每次课PPT/04 面向对象（下）-2.pptx
+++ b/PPT/每次课PPT/04 面向对象（下）-2.pptx
@@ -36,7 +36,7 @@
     <p:sldId id="683" r:id="rId24"/>
   </p:sldIdLst>
   <p:sldSz cx="12196763" cy="6858000"/>
-  <p:notesSz cx="6858000" cy="9144000"/>
+  <p:notesSz cx="7099300" cy="10234613"/>
   <p:defaultTextStyle>
     <a:defPPr>
       <a:defRPr lang="zh-CN"/>
@@ -205,17 +205,17 @@
         <p:spPr>
           <a:xfrm>
             <a:off x="0" y="0"/>
-            <a:ext cx="2971800" cy="457200"/>
+            <a:ext cx="3076363" cy="511731"/>
           </a:xfrm>
           <a:prstGeom prst="rect">
             <a:avLst/>
           </a:prstGeom>
         </p:spPr>
         <p:txBody>
-          <a:bodyPr vert="horz" lIns="91440" tIns="45720" rIns="91440" bIns="45720" rtlCol="0"/>
+          <a:bodyPr vert="horz" lIns="99048" tIns="49524" rIns="99048" bIns="49524" rtlCol="0"/>
           <a:lstStyle>
             <a:lvl1pPr algn="l">
-              <a:defRPr sz="1200"/>
+              <a:defRPr sz="1300"/>
             </a:lvl1pPr>
           </a:lstStyle>
           <a:p>
@@ -235,18 +235,18 @@
         </p:nvSpPr>
         <p:spPr>
           <a:xfrm>
-            <a:off x="3884613" y="0"/>
-            <a:ext cx="2971800" cy="457200"/>
+            <a:off x="4021294" y="0"/>
+            <a:ext cx="3076363" cy="511731"/>
           </a:xfrm>
           <a:prstGeom prst="rect">
             <a:avLst/>
           </a:prstGeom>
         </p:spPr>
         <p:txBody>
-          <a:bodyPr vert="horz" lIns="91440" tIns="45720" rIns="91440" bIns="45720" rtlCol="0"/>
+          <a:bodyPr vert="horz" lIns="99048" tIns="49524" rIns="99048" bIns="49524" rtlCol="0"/>
           <a:lstStyle>
             <a:lvl1pPr algn="r">
-              <a:defRPr sz="1200"/>
+              <a:defRPr sz="1300"/>
             </a:lvl1pPr>
           </a:lstStyle>
           <a:p>
@@ -271,18 +271,18 @@
         </p:nvSpPr>
         <p:spPr>
           <a:xfrm>
-            <a:off x="0" y="8685213"/>
-            <a:ext cx="2971800" cy="457200"/>
+            <a:off x="0" y="9721106"/>
+            <a:ext cx="3076363" cy="511731"/>
           </a:xfrm>
           <a:prstGeom prst="rect">
             <a:avLst/>
           </a:prstGeom>
         </p:spPr>
         <p:txBody>
-          <a:bodyPr vert="horz" lIns="91440" tIns="45720" rIns="91440" bIns="45720" rtlCol="0" anchor="b"/>
+          <a:bodyPr vert="horz" lIns="99048" tIns="49524" rIns="99048" bIns="49524" rtlCol="0" anchor="b"/>
           <a:lstStyle>
             <a:lvl1pPr algn="l">
-              <a:defRPr sz="1200"/>
+              <a:defRPr sz="1300"/>
             </a:lvl1pPr>
           </a:lstStyle>
           <a:p>
@@ -302,18 +302,18 @@
         </p:nvSpPr>
         <p:spPr>
           <a:xfrm>
-            <a:off x="3884613" y="8685213"/>
-            <a:ext cx="2971800" cy="457200"/>
+            <a:off x="4021294" y="9721106"/>
+            <a:ext cx="3076363" cy="511731"/>
           </a:xfrm>
           <a:prstGeom prst="rect">
             <a:avLst/>
           </a:prstGeom>
         </p:spPr>
         <p:txBody>
-          <a:bodyPr vert="horz" lIns="91440" tIns="45720" rIns="91440" bIns="45720" rtlCol="0" anchor="b"/>
+          <a:bodyPr vert="horz" lIns="99048" tIns="49524" rIns="99048" bIns="49524" rtlCol="0" anchor="b"/>
           <a:lstStyle>
             <a:lvl1pPr algn="r">
-              <a:defRPr sz="1200"/>
+              <a:defRPr sz="1300"/>
             </a:lvl1pPr>
           </a:lstStyle>
           <a:p>
@@ -375,7 +375,7 @@
         <p:spPr bwMode="auto">
           <a:xfrm>
             <a:off x="0" y="0"/>
-            <a:ext cx="2971800" cy="457200"/>
+            <a:ext cx="3076363" cy="511731"/>
           </a:xfrm>
           <a:prstGeom prst="rect">
             <a:avLst/>
@@ -415,14 +415,14 @@
           </a:extLst>
         </p:spPr>
         <p:txBody>
-          <a:bodyPr vert="horz" wrap="square" lIns="91440" tIns="45720" rIns="91440" bIns="45720" numCol="1" anchor="t" anchorCtr="0" compatLnSpc="1">
+          <a:bodyPr vert="horz" wrap="square" lIns="99048" tIns="49524" rIns="99048" bIns="49524" numCol="1" anchor="t" anchorCtr="0" compatLnSpc="1">
             <a:prstTxWarp prst="textNoShape">
               <a:avLst/>
             </a:prstTxWarp>
           </a:bodyPr>
           <a:lstStyle>
             <a:lvl1pPr eaLnBrk="0" hangingPunct="0">
-              <a:defRPr sz="1200"/>
+              <a:defRPr sz="1300"/>
             </a:lvl1pPr>
           </a:lstStyle>
           <a:p>
@@ -442,8 +442,8 @@
         </p:nvSpPr>
         <p:spPr bwMode="auto">
           <a:xfrm>
-            <a:off x="3884613" y="0"/>
-            <a:ext cx="2971800" cy="457200"/>
+            <a:off x="4021294" y="0"/>
+            <a:ext cx="3076363" cy="511731"/>
           </a:xfrm>
           <a:prstGeom prst="rect">
             <a:avLst/>
@@ -483,14 +483,14 @@
           </a:extLst>
         </p:spPr>
         <p:txBody>
-          <a:bodyPr vert="horz" wrap="square" lIns="91440" tIns="45720" rIns="91440" bIns="45720" numCol="1" anchor="t" anchorCtr="0" compatLnSpc="1">
+          <a:bodyPr vert="horz" wrap="square" lIns="99048" tIns="49524" rIns="99048" bIns="49524" numCol="1" anchor="t" anchorCtr="0" compatLnSpc="1">
             <a:prstTxWarp prst="textNoShape">
               <a:avLst/>
             </a:prstTxWarp>
           </a:bodyPr>
           <a:lstStyle>
             <a:lvl1pPr algn="r" eaLnBrk="0" hangingPunct="0">
-              <a:defRPr sz="1200"/>
+              <a:defRPr sz="1300"/>
             </a:lvl1pPr>
           </a:lstStyle>
           <a:p>
@@ -515,8 +515,8 @@
         </p:nvSpPr>
         <p:spPr bwMode="auto">
           <a:xfrm>
-            <a:off x="1143000" y="685800"/>
-            <a:ext cx="4572000" cy="3429000"/>
+            <a:off x="138113" y="768350"/>
+            <a:ext cx="6823075" cy="3836988"/>
           </a:xfrm>
           <a:prstGeom prst="rect">
             <a:avLst/>
@@ -568,8 +568,8 @@
         </p:nvSpPr>
         <p:spPr bwMode="auto">
           <a:xfrm>
-            <a:off x="685800" y="4343400"/>
-            <a:ext cx="5486400" cy="4114800"/>
+            <a:off x="709930" y="4861441"/>
+            <a:ext cx="5679440" cy="4605576"/>
           </a:xfrm>
           <a:prstGeom prst="rect">
             <a:avLst/>
@@ -609,7 +609,7 @@
           </a:extLst>
         </p:spPr>
         <p:txBody>
-          <a:bodyPr vert="horz" wrap="square" lIns="91440" tIns="45720" rIns="91440" bIns="45720" numCol="1" anchor="ctr" anchorCtr="0" compatLnSpc="1">
+          <a:bodyPr vert="horz" wrap="square" lIns="99048" tIns="49524" rIns="99048" bIns="49524" numCol="1" anchor="ctr" anchorCtr="0" compatLnSpc="1">
             <a:prstTxWarp prst="textNoShape">
               <a:avLst/>
             </a:prstTxWarp>
@@ -664,8 +664,8 @@
         </p:nvSpPr>
         <p:spPr bwMode="auto">
           <a:xfrm>
-            <a:off x="0" y="8685213"/>
-            <a:ext cx="2971800" cy="457200"/>
+            <a:off x="0" y="9721106"/>
+            <a:ext cx="3076363" cy="511731"/>
           </a:xfrm>
           <a:prstGeom prst="rect">
             <a:avLst/>
@@ -705,14 +705,14 @@
           </a:extLst>
         </p:spPr>
         <p:txBody>
-          <a:bodyPr vert="horz" wrap="square" lIns="91440" tIns="45720" rIns="91440" bIns="45720" numCol="1" anchor="b" anchorCtr="0" compatLnSpc="1">
+          <a:bodyPr vert="horz" wrap="square" lIns="99048" tIns="49524" rIns="99048" bIns="49524" numCol="1" anchor="b" anchorCtr="0" compatLnSpc="1">
             <a:prstTxWarp prst="textNoShape">
               <a:avLst/>
             </a:prstTxWarp>
           </a:bodyPr>
           <a:lstStyle>
             <a:lvl1pPr eaLnBrk="0" hangingPunct="0">
-              <a:defRPr sz="1200"/>
+              <a:defRPr sz="1300"/>
             </a:lvl1pPr>
           </a:lstStyle>
           <a:p>
@@ -732,8 +732,8 @@
         </p:nvSpPr>
         <p:spPr bwMode="auto">
           <a:xfrm>
-            <a:off x="3884613" y="8685213"/>
-            <a:ext cx="2971800" cy="457200"/>
+            <a:off x="4021294" y="9721106"/>
+            <a:ext cx="3076363" cy="511731"/>
           </a:xfrm>
           <a:prstGeom prst="rect">
             <a:avLst/>
@@ -773,14 +773,14 @@
           </a:extLst>
         </p:spPr>
         <p:txBody>
-          <a:bodyPr vert="horz" wrap="square" lIns="91440" tIns="45720" rIns="91440" bIns="45720" numCol="1" anchor="b" anchorCtr="0" compatLnSpc="1">
+          <a:bodyPr vert="horz" wrap="square" lIns="99048" tIns="49524" rIns="99048" bIns="49524" numCol="1" anchor="b" anchorCtr="0" compatLnSpc="1">
             <a:prstTxWarp prst="textNoShape">
               <a:avLst/>
             </a:prstTxWarp>
           </a:bodyPr>
           <a:lstStyle>
             <a:lvl1pPr algn="r" eaLnBrk="0" hangingPunct="0">
-              <a:defRPr sz="1200"/>
+              <a:defRPr sz="1300"/>
             </a:lvl1pPr>
           </a:lstStyle>
           <a:p>
@@ -955,8 +955,8 @@
         </p:nvSpPr>
         <p:spPr>
           <a:xfrm>
-            <a:off x="381000" y="685800"/>
-            <a:ext cx="6096000" cy="3429000"/>
+            <a:off x="138113" y="768350"/>
+            <a:ext cx="6823075" cy="3836988"/>
           </a:xfrm>
         </p:spPr>
       </p:sp>
@@ -1053,8 +1053,8 @@
         </p:nvSpPr>
         <p:spPr>
           <a:xfrm>
-            <a:off x="381000" y="685800"/>
-            <a:ext cx="6096000" cy="3429000"/>
+            <a:off x="138113" y="768350"/>
+            <a:ext cx="6823075" cy="3836988"/>
           </a:xfrm>
         </p:spPr>
       </p:sp>
@@ -1151,8 +1151,8 @@
         </p:nvSpPr>
         <p:spPr>
           <a:xfrm>
-            <a:off x="381000" y="685800"/>
-            <a:ext cx="6096000" cy="3429000"/>
+            <a:off x="138113" y="768350"/>
+            <a:ext cx="6823075" cy="3836988"/>
           </a:xfrm>
         </p:spPr>
       </p:sp>
@@ -1249,8 +1249,8 @@
         </p:nvSpPr>
         <p:spPr>
           <a:xfrm>
-            <a:off x="381000" y="685800"/>
-            <a:ext cx="6096000" cy="3429000"/>
+            <a:off x="138113" y="768350"/>
+            <a:ext cx="6823075" cy="3836988"/>
           </a:xfrm>
         </p:spPr>
       </p:sp>
@@ -1347,8 +1347,8 @@
         </p:nvSpPr>
         <p:spPr>
           <a:xfrm>
-            <a:off x="381000" y="685800"/>
-            <a:ext cx="6096000" cy="3429000"/>
+            <a:off x="138113" y="768350"/>
+            <a:ext cx="6823075" cy="3836988"/>
           </a:xfrm>
         </p:spPr>
       </p:sp>
@@ -1445,8 +1445,8 @@
         </p:nvSpPr>
         <p:spPr>
           <a:xfrm>
-            <a:off x="381000" y="685800"/>
-            <a:ext cx="6096000" cy="3429000"/>
+            <a:off x="138113" y="768350"/>
+            <a:ext cx="6823075" cy="3836988"/>
           </a:xfrm>
         </p:spPr>
       </p:sp>
@@ -1543,8 +1543,8 @@
         </p:nvSpPr>
         <p:spPr>
           <a:xfrm>
-            <a:off x="381000" y="685800"/>
-            <a:ext cx="6096000" cy="3429000"/>
+            <a:off x="138113" y="768350"/>
+            <a:ext cx="6823075" cy="3836988"/>
           </a:xfrm>
         </p:spPr>
       </p:sp>
@@ -1641,8 +1641,8 @@
         </p:nvSpPr>
         <p:spPr>
           <a:xfrm>
-            <a:off x="381000" y="685800"/>
-            <a:ext cx="6096000" cy="3429000"/>
+            <a:off x="138113" y="768350"/>
+            <a:ext cx="6823075" cy="3836988"/>
           </a:xfrm>
         </p:spPr>
       </p:sp>
@@ -1739,8 +1739,8 @@
         </p:nvSpPr>
         <p:spPr>
           <a:xfrm>
-            <a:off x="381000" y="685800"/>
-            <a:ext cx="6096000" cy="3429000"/>
+            <a:off x="138113" y="768350"/>
+            <a:ext cx="6823075" cy="3836988"/>
           </a:xfrm>
         </p:spPr>
       </p:sp>
@@ -1837,8 +1837,8 @@
         </p:nvSpPr>
         <p:spPr>
           <a:xfrm>
-            <a:off x="381000" y="685800"/>
-            <a:ext cx="6096000" cy="3429000"/>
+            <a:off x="138113" y="768350"/>
+            <a:ext cx="6823075" cy="3836988"/>
           </a:xfrm>
         </p:spPr>
       </p:sp>
@@ -1935,8 +1935,8 @@
         </p:nvSpPr>
         <p:spPr>
           <a:xfrm>
-            <a:off x="381000" y="685800"/>
-            <a:ext cx="6096000" cy="3429000"/>
+            <a:off x="138113" y="768350"/>
+            <a:ext cx="6823075" cy="3836988"/>
           </a:xfrm>
         </p:spPr>
       </p:sp>
@@ -2033,8 +2033,8 @@
         </p:nvSpPr>
         <p:spPr>
           <a:xfrm>
-            <a:off x="381000" y="685800"/>
-            <a:ext cx="6096000" cy="3429000"/>
+            <a:off x="138113" y="768350"/>
+            <a:ext cx="6823075" cy="3836988"/>
           </a:xfrm>
         </p:spPr>
       </p:sp>
@@ -2131,8 +2131,8 @@
         </p:nvSpPr>
         <p:spPr>
           <a:xfrm>
-            <a:off x="381000" y="685800"/>
-            <a:ext cx="6096000" cy="3429000"/>
+            <a:off x="138113" y="768350"/>
+            <a:ext cx="6823075" cy="3836988"/>
           </a:xfrm>
         </p:spPr>
       </p:sp>
@@ -2229,8 +2229,8 @@
         </p:nvSpPr>
         <p:spPr>
           <a:xfrm>
-            <a:off x="381000" y="685800"/>
-            <a:ext cx="6096000" cy="3429000"/>
+            <a:off x="138113" y="768350"/>
+            <a:ext cx="6823075" cy="3836988"/>
           </a:xfrm>
         </p:spPr>
       </p:sp>
@@ -2327,8 +2327,8 @@
         </p:nvSpPr>
         <p:spPr>
           <a:xfrm>
-            <a:off x="381000" y="685800"/>
-            <a:ext cx="6096000" cy="3429000"/>
+            <a:off x="138113" y="768350"/>
+            <a:ext cx="6823075" cy="3836988"/>
           </a:xfrm>
         </p:spPr>
       </p:sp>
@@ -2417,8 +2417,8 @@
         </p:nvSpPr>
         <p:spPr>
           <a:xfrm>
-            <a:off x="381000" y="685800"/>
-            <a:ext cx="6096000" cy="3429000"/>
+            <a:off x="138113" y="768350"/>
+            <a:ext cx="6823075" cy="3836988"/>
           </a:xfrm>
         </p:spPr>
       </p:sp>
@@ -2515,8 +2515,8 @@
         </p:nvSpPr>
         <p:spPr>
           <a:xfrm>
-            <a:off x="381000" y="685800"/>
-            <a:ext cx="6096000" cy="3429000"/>
+            <a:off x="138113" y="768350"/>
+            <a:ext cx="6823075" cy="3836988"/>
           </a:xfrm>
         </p:spPr>
       </p:sp>
@@ -2613,8 +2613,8 @@
         </p:nvSpPr>
         <p:spPr>
           <a:xfrm>
-            <a:off x="381000" y="685800"/>
-            <a:ext cx="6096000" cy="3429000"/>
+            <a:off x="138113" y="768350"/>
+            <a:ext cx="6823075" cy="3836988"/>
           </a:xfrm>
         </p:spPr>
       </p:sp>
@@ -2711,8 +2711,8 @@
         </p:nvSpPr>
         <p:spPr>
           <a:xfrm>
-            <a:off x="381000" y="685800"/>
-            <a:ext cx="6096000" cy="3429000"/>
+            <a:off x="138113" y="768350"/>
+            <a:ext cx="6823075" cy="3836988"/>
           </a:xfrm>
         </p:spPr>
       </p:sp>
@@ -2809,8 +2809,8 @@
         </p:nvSpPr>
         <p:spPr>
           <a:xfrm>
-            <a:off x="381000" y="685800"/>
-            <a:ext cx="6096000" cy="3429000"/>
+            <a:off x="138113" y="768350"/>
+            <a:ext cx="6823075" cy="3836988"/>
           </a:xfrm>
         </p:spPr>
       </p:sp>
@@ -2907,8 +2907,8 @@
         </p:nvSpPr>
         <p:spPr>
           <a:xfrm>
-            <a:off x="381000" y="685800"/>
-            <a:ext cx="6096000" cy="3429000"/>
+            <a:off x="138113" y="768350"/>
+            <a:ext cx="6823075" cy="3836988"/>
           </a:xfrm>
         </p:spPr>
       </p:sp>
@@ -3005,8 +3005,8 @@
         </p:nvSpPr>
         <p:spPr>
           <a:xfrm>
-            <a:off x="381000" y="685800"/>
-            <a:ext cx="6096000" cy="3429000"/>
+            <a:off x="138113" y="768350"/>
+            <a:ext cx="6823075" cy="3836988"/>
           </a:xfrm>
         </p:spPr>
       </p:sp>
@@ -3103,8 +3103,8 @@
         </p:nvSpPr>
         <p:spPr>
           <a:xfrm>
-            <a:off x="381000" y="685800"/>
-            <a:ext cx="6096000" cy="3429000"/>
+            <a:off x="138113" y="768350"/>
+            <a:ext cx="6823075" cy="3836988"/>
           </a:xfrm>
         </p:spPr>
       </p:sp>
@@ -13209,8 +13209,8 @@
   <p:transition spd="slow" advTm="8563">
     <p:push dir="r"/>
   </p:transition>
-  <mc:AlternateContent xmlns:mc="http://schemas.openxmlformats.org/markup-compatibility/2006">
-    <mc:Choice xmlns:p14="http://schemas.microsoft.com/office/powerpoint/2010/main" Requires="p14">
+  <mc:AlternateContent xmlns:mc="http://schemas.openxmlformats.org/markup-compatibility/2006" xmlns:p14="http://schemas.microsoft.com/office/powerpoint/2010/main">
+    <mc:Choice Requires="p14">
       <p:timing>
         <p:tnLst>
           <p:par>
@@ -14162,7 +14162,7 @@
         </p:bldLst>
       </p:timing>
     </mc:Choice>
-    <mc:Fallback>
+    <mc:Fallback xmlns="">
       <p:timing>
         <p:tnLst>
           <p:par>
@@ -16072,6 +16072,153 @@
                 <a:headEnd/>
                 <a:tailEnd/>
               </a14:hiddenLine>
+            </a:ext>
+          </a:extLst>
+        </p:spPr>
+      </p:pic>
+      <p:pic>
+        <p:nvPicPr>
+          <p:cNvPr id="2" name="Picture 2"/>
+          <p:cNvPicPr>
+            <a:picLocks noChangeAspect="1" noChangeArrowheads="1"/>
+          </p:cNvPicPr>
+          <p:nvPr/>
+        </p:nvPicPr>
+        <p:blipFill>
+          <a:blip r:embed="rId4">
+            <a:extLst>
+              <a:ext uri="{28A0092B-C50C-407E-A947-70E740481C1C}">
+                <a14:useLocalDpi xmlns:a14="http://schemas.microsoft.com/office/drawing/2010/main" val="0"/>
+              </a:ext>
+            </a:extLst>
+          </a:blip>
+          <a:srcRect/>
+          <a:stretch>
+            <a:fillRect/>
+          </a:stretch>
+        </p:blipFill>
+        <p:spPr bwMode="auto">
+          <a:xfrm>
+            <a:off x="204874" y="5048854"/>
+            <a:ext cx="5893506" cy="1603938"/>
+          </a:xfrm>
+          <a:prstGeom prst="rect">
+            <a:avLst/>
+          </a:prstGeom>
+          <a:noFill/>
+          <a:ln w="9525">
+            <a:solidFill>
+              <a:schemeClr val="tx1"/>
+            </a:solidFill>
+            <a:miter lim="800000"/>
+            <a:headEnd/>
+            <a:tailEnd/>
+          </a:ln>
+          <a:extLst>
+            <a:ext uri="{909E8E84-426E-40DD-AFC4-6F175D3DCCD1}">
+              <a14:hiddenFill xmlns:a14="http://schemas.microsoft.com/office/drawing/2010/main">
+                <a:solidFill>
+                  <a:schemeClr val="accent1"/>
+                </a:solidFill>
+              </a14:hiddenFill>
+            </a:ext>
+          </a:extLst>
+        </p:spPr>
+      </p:pic>
+      <p:pic>
+        <p:nvPicPr>
+          <p:cNvPr id="1027" name="Picture 3"/>
+          <p:cNvPicPr>
+            <a:picLocks noChangeAspect="1" noChangeArrowheads="1"/>
+          </p:cNvPicPr>
+          <p:nvPr/>
+        </p:nvPicPr>
+        <p:blipFill>
+          <a:blip r:embed="rId5">
+            <a:extLst>
+              <a:ext uri="{28A0092B-C50C-407E-A947-70E740481C1C}">
+                <a14:useLocalDpi xmlns:a14="http://schemas.microsoft.com/office/drawing/2010/main" val="0"/>
+              </a:ext>
+            </a:extLst>
+          </a:blip>
+          <a:srcRect/>
+          <a:stretch>
+            <a:fillRect/>
+          </a:stretch>
+        </p:blipFill>
+        <p:spPr bwMode="auto">
+          <a:xfrm>
+            <a:off x="6242397" y="5018214"/>
+            <a:ext cx="5444827" cy="1634578"/>
+          </a:xfrm>
+          <a:prstGeom prst="rect">
+            <a:avLst/>
+          </a:prstGeom>
+          <a:noFill/>
+          <a:ln w="9525">
+            <a:solidFill>
+              <a:schemeClr val="tx1"/>
+            </a:solidFill>
+            <a:miter lim="800000"/>
+            <a:headEnd/>
+            <a:tailEnd/>
+          </a:ln>
+          <a:extLst>
+            <a:ext uri="{909E8E84-426E-40DD-AFC4-6F175D3DCCD1}">
+              <a14:hiddenFill xmlns:a14="http://schemas.microsoft.com/office/drawing/2010/main">
+                <a:solidFill>
+                  <a:schemeClr val="accent1"/>
+                </a:solidFill>
+              </a14:hiddenFill>
+            </a:ext>
+          </a:extLst>
+        </p:spPr>
+      </p:pic>
+      <p:pic>
+        <p:nvPicPr>
+          <p:cNvPr id="1028" name="Picture 4"/>
+          <p:cNvPicPr>
+            <a:picLocks noChangeAspect="1" noChangeArrowheads="1"/>
+          </p:cNvPicPr>
+          <p:nvPr/>
+        </p:nvPicPr>
+        <p:blipFill>
+          <a:blip r:embed="rId6">
+            <a:extLst>
+              <a:ext uri="{28A0092B-C50C-407E-A947-70E740481C1C}">
+                <a14:useLocalDpi xmlns:a14="http://schemas.microsoft.com/office/drawing/2010/main" val="0"/>
+              </a:ext>
+            </a:extLst>
+          </a:blip>
+          <a:srcRect/>
+          <a:stretch>
+            <a:fillRect/>
+          </a:stretch>
+        </p:blipFill>
+        <p:spPr bwMode="auto">
+          <a:xfrm>
+            <a:off x="7385999" y="980728"/>
+            <a:ext cx="4417665" cy="1158297"/>
+          </a:xfrm>
+          <a:prstGeom prst="rect">
+            <a:avLst/>
+          </a:prstGeom>
+          <a:noFill/>
+          <a:ln w="9525">
+            <a:solidFill>
+              <a:schemeClr val="tx1"/>
+            </a:solidFill>
+            <a:miter lim="800000"/>
+            <a:headEnd/>
+            <a:tailEnd/>
+          </a:ln>
+          <a:extLst>
+            <a:ext uri="{909E8E84-426E-40DD-AFC4-6F175D3DCCD1}">
+              <a14:hiddenFill xmlns:a14="http://schemas.microsoft.com/office/drawing/2010/main">
+                <a:solidFill>
+                  <a:schemeClr val="accent1"/>
+                </a:solidFill>
+              </a14:hiddenFill>
             </a:ext>
           </a:extLst>
         </p:spPr>

</xml_diff>